<commit_message>
Yes / no checker
</commit_message>
<xml_diff>
--- a/lucky_unicorn_slides.pptx
+++ b/lucky_unicorn_slides.pptx
@@ -15,6 +15,7 @@
     <p:sldId id="264" r:id="rId9"/>
     <p:sldId id="265" r:id="rId10"/>
     <p:sldId id="266" r:id="rId11"/>
+    <p:sldId id="267" r:id="rId12"/>
   </p:sldIdLst>
   <p:sldSz cx="12192000" cy="6858000"/>
   <p:notesSz cx="6858000" cy="9144000"/>
@@ -124,7 +125,7 @@
 <file path=ppt/revisionInfo.xml><?xml version="1.0" encoding="utf-8"?>
 <p1510:revInfo xmlns:a="http://schemas.openxmlformats.org/drawingml/2006/main" xmlns:r="http://schemas.openxmlformats.org/officeDocument/2006/relationships" xmlns:p1510="http://schemas.microsoft.com/office/powerpoint/2015/10/main">
   <p1510:revLst>
-    <p1510:client id="{821FC779-2761-8A4F-B0FC-7B9FB95D7136}" v="16" dt="2021-04-24T21:55:54.818"/>
+    <p1510:client id="{821FC779-2761-8A4F-B0FC-7B9FB95D7136}" v="18" dt="2021-05-03T03:13:03.765"/>
   </p1510:revLst>
 </p1510:revInfo>
 </file>
@@ -134,7 +135,7 @@
   <pc:docChgLst>
     <pc:chgData name="Armaan Singh" userId="6888fe4d-4c6a-4dac-a487-c1c8f6b23fb9" providerId="ADAL" clId="{821FC779-2761-8A4F-B0FC-7B9FB95D7136}"/>
     <pc:docChg chg="undo custSel addSld delSld modSld">
-      <pc:chgData name="Armaan Singh" userId="6888fe4d-4c6a-4dac-a487-c1c8f6b23fb9" providerId="ADAL" clId="{821FC779-2761-8A4F-B0FC-7B9FB95D7136}" dt="2021-04-24T21:55:58.082" v="2220" actId="26606"/>
+      <pc:chgData name="Armaan Singh" userId="6888fe4d-4c6a-4dac-a487-c1c8f6b23fb9" providerId="ADAL" clId="{821FC779-2761-8A4F-B0FC-7B9FB95D7136}" dt="2021-05-03T03:13:54.739" v="2340" actId="26606"/>
       <pc:docMkLst>
         <pc:docMk/>
       </pc:docMkLst>
@@ -735,6 +736,109 @@
           </ac:picMkLst>
         </pc:picChg>
       </pc:sldChg>
+      <pc:sldChg chg="addSp delSp modSp new mod setBg addAnim delAnim">
+        <pc:chgData name="Armaan Singh" userId="6888fe4d-4c6a-4dac-a487-c1c8f6b23fb9" providerId="ADAL" clId="{821FC779-2761-8A4F-B0FC-7B9FB95D7136}" dt="2021-05-03T03:13:54.739" v="2340" actId="26606"/>
+        <pc:sldMkLst>
+          <pc:docMk/>
+          <pc:sldMk cId="483687354" sldId="267"/>
+        </pc:sldMkLst>
+        <pc:spChg chg="mod">
+          <ac:chgData name="Armaan Singh" userId="6888fe4d-4c6a-4dac-a487-c1c8f6b23fb9" providerId="ADAL" clId="{821FC779-2761-8A4F-B0FC-7B9FB95D7136}" dt="2021-05-03T03:13:54.739" v="2340" actId="26606"/>
+          <ac:spMkLst>
+            <pc:docMk/>
+            <pc:sldMk cId="483687354" sldId="267"/>
+            <ac:spMk id="2" creationId="{0C8893BE-BB41-0142-A941-7BCB5D2A6EE7}"/>
+          </ac:spMkLst>
+        </pc:spChg>
+        <pc:spChg chg="del">
+          <ac:chgData name="Armaan Singh" userId="6888fe4d-4c6a-4dac-a487-c1c8f6b23fb9" providerId="ADAL" clId="{821FC779-2761-8A4F-B0FC-7B9FB95D7136}" dt="2021-05-03T03:12:03.771" v="2248" actId="478"/>
+          <ac:spMkLst>
+            <pc:docMk/>
+            <pc:sldMk cId="483687354" sldId="267"/>
+            <ac:spMk id="3" creationId="{C684888A-142B-0C45-8133-8BA29AC851FB}"/>
+          </ac:spMkLst>
+        </pc:spChg>
+        <pc:spChg chg="add mod">
+          <ac:chgData name="Armaan Singh" userId="6888fe4d-4c6a-4dac-a487-c1c8f6b23fb9" providerId="ADAL" clId="{821FC779-2761-8A4F-B0FC-7B9FB95D7136}" dt="2021-05-03T03:13:54.739" v="2340" actId="26606"/>
+          <ac:spMkLst>
+            <pc:docMk/>
+            <pc:sldMk cId="483687354" sldId="267"/>
+            <ac:spMk id="5" creationId="{18526060-96E6-C049-B46C-408A3739C664}"/>
+          </ac:spMkLst>
+        </pc:spChg>
+        <pc:spChg chg="add del">
+          <ac:chgData name="Armaan Singh" userId="6888fe4d-4c6a-4dac-a487-c1c8f6b23fb9" providerId="ADAL" clId="{821FC779-2761-8A4F-B0FC-7B9FB95D7136}" dt="2021-05-03T03:13:54.739" v="2340" actId="26606"/>
+          <ac:spMkLst>
+            <pc:docMk/>
+            <pc:sldMk cId="483687354" sldId="267"/>
+            <ac:spMk id="9" creationId="{1707FC24-6981-43D9-B525-C7832BA22463}"/>
+          </ac:spMkLst>
+        </pc:spChg>
+        <pc:spChg chg="add del">
+          <ac:chgData name="Armaan Singh" userId="6888fe4d-4c6a-4dac-a487-c1c8f6b23fb9" providerId="ADAL" clId="{821FC779-2761-8A4F-B0FC-7B9FB95D7136}" dt="2021-05-03T03:13:54.731" v="2339" actId="26606"/>
+          <ac:spMkLst>
+            <pc:docMk/>
+            <pc:sldMk cId="483687354" sldId="267"/>
+            <ac:spMk id="14" creationId="{201CC55D-ED54-4C5C-95E6-10947BD1103B}"/>
+          </ac:spMkLst>
+        </pc:spChg>
+        <pc:spChg chg="add del">
+          <ac:chgData name="Armaan Singh" userId="6888fe4d-4c6a-4dac-a487-c1c8f6b23fb9" providerId="ADAL" clId="{821FC779-2761-8A4F-B0FC-7B9FB95D7136}" dt="2021-05-03T03:13:54.731" v="2339" actId="26606"/>
+          <ac:spMkLst>
+            <pc:docMk/>
+            <pc:sldMk cId="483687354" sldId="267"/>
+            <ac:spMk id="20" creationId="{3873B707-463F-40B0-8227-E8CC6C67EB25}"/>
+          </ac:spMkLst>
+        </pc:spChg>
+        <pc:spChg chg="add del">
+          <ac:chgData name="Armaan Singh" userId="6888fe4d-4c6a-4dac-a487-c1c8f6b23fb9" providerId="ADAL" clId="{821FC779-2761-8A4F-B0FC-7B9FB95D7136}" dt="2021-05-03T03:13:54.731" v="2339" actId="26606"/>
+          <ac:spMkLst>
+            <pc:docMk/>
+            <pc:sldMk cId="483687354" sldId="267"/>
+            <ac:spMk id="22" creationId="{C13237C8-E62C-4F0D-A318-BD6FB6C2D138}"/>
+          </ac:spMkLst>
+        </pc:spChg>
+        <pc:spChg chg="add del">
+          <ac:chgData name="Armaan Singh" userId="6888fe4d-4c6a-4dac-a487-c1c8f6b23fb9" providerId="ADAL" clId="{821FC779-2761-8A4F-B0FC-7B9FB95D7136}" dt="2021-05-03T03:13:54.731" v="2339" actId="26606"/>
+          <ac:spMkLst>
+            <pc:docMk/>
+            <pc:sldMk cId="483687354" sldId="267"/>
+            <ac:spMk id="24" creationId="{19C9EAEA-39D0-4B0E-A0EB-51E7B26740B1}"/>
+          </ac:spMkLst>
+        </pc:spChg>
+        <pc:spChg chg="add">
+          <ac:chgData name="Armaan Singh" userId="6888fe4d-4c6a-4dac-a487-c1c8f6b23fb9" providerId="ADAL" clId="{821FC779-2761-8A4F-B0FC-7B9FB95D7136}" dt="2021-05-03T03:13:54.739" v="2340" actId="26606"/>
+          <ac:spMkLst>
+            <pc:docMk/>
+            <pc:sldMk cId="483687354" sldId="267"/>
+            <ac:spMk id="26" creationId="{CEB41C5C-0F34-4DDA-9D7C-5E717F35F60C}"/>
+          </ac:spMkLst>
+        </pc:spChg>
+        <pc:grpChg chg="add del">
+          <ac:chgData name="Armaan Singh" userId="6888fe4d-4c6a-4dac-a487-c1c8f6b23fb9" providerId="ADAL" clId="{821FC779-2761-8A4F-B0FC-7B9FB95D7136}" dt="2021-05-03T03:13:54.731" v="2339" actId="26606"/>
+          <ac:grpSpMkLst>
+            <pc:docMk/>
+            <pc:sldMk cId="483687354" sldId="267"/>
+            <ac:grpSpMk id="16" creationId="{1DE889C7-FAD6-4397-98E2-05D503484459}"/>
+          </ac:grpSpMkLst>
+        </pc:grpChg>
+        <pc:picChg chg="add mod ord">
+          <ac:chgData name="Armaan Singh" userId="6888fe4d-4c6a-4dac-a487-c1c8f6b23fb9" providerId="ADAL" clId="{821FC779-2761-8A4F-B0FC-7B9FB95D7136}" dt="2021-05-03T03:13:54.739" v="2340" actId="26606"/>
+          <ac:picMkLst>
+            <pc:docMk/>
+            <pc:sldMk cId="483687354" sldId="267"/>
+            <ac:picMk id="4" creationId="{90434224-9C81-9E43-9ADE-E77CDCF93602}"/>
+          </ac:picMkLst>
+        </pc:picChg>
+        <pc:cxnChg chg="add">
+          <ac:chgData name="Armaan Singh" userId="6888fe4d-4c6a-4dac-a487-c1c8f6b23fb9" providerId="ADAL" clId="{821FC779-2761-8A4F-B0FC-7B9FB95D7136}" dt="2021-05-03T03:13:54.739" v="2340" actId="26606"/>
+          <ac:cxnSpMkLst>
+            <pc:docMk/>
+            <pc:sldMk cId="483687354" sldId="267"/>
+            <ac:cxnSpMk id="27" creationId="{57E1E5E6-F385-4E9C-B201-BA5BDE5CAD52}"/>
+          </ac:cxnSpMkLst>
+        </pc:cxnChg>
+      </pc:sldChg>
     </pc:docChg>
   </pc:docChgLst>
 </pc:chgInfo>
@@ -887,7 +991,7 @@
           <a:p>
             <a:fld id="{0022677E-7FF4-B24E-882D-1485C2C20337}" type="datetimeFigureOut">
               <a:rPr lang="en-GB" smtClean="0"/>
-              <a:t>25/04/2021</a:t>
+              <a:t>03/05/2021</a:t>
             </a:fld>
             <a:endParaRPr lang="en-GB"/>
           </a:p>
@@ -1085,7 +1189,7 @@
           <a:p>
             <a:fld id="{0022677E-7FF4-B24E-882D-1485C2C20337}" type="datetimeFigureOut">
               <a:rPr lang="en-GB" smtClean="0"/>
-              <a:t>25/04/2021</a:t>
+              <a:t>03/05/2021</a:t>
             </a:fld>
             <a:endParaRPr lang="en-GB"/>
           </a:p>
@@ -1293,7 +1397,7 @@
           <a:p>
             <a:fld id="{0022677E-7FF4-B24E-882D-1485C2C20337}" type="datetimeFigureOut">
               <a:rPr lang="en-GB" smtClean="0"/>
-              <a:t>25/04/2021</a:t>
+              <a:t>03/05/2021</a:t>
             </a:fld>
             <a:endParaRPr lang="en-GB"/>
           </a:p>
@@ -1491,7 +1595,7 @@
           <a:p>
             <a:fld id="{0022677E-7FF4-B24E-882D-1485C2C20337}" type="datetimeFigureOut">
               <a:rPr lang="en-GB" smtClean="0"/>
-              <a:t>25/04/2021</a:t>
+              <a:t>03/05/2021</a:t>
             </a:fld>
             <a:endParaRPr lang="en-GB"/>
           </a:p>
@@ -1766,7 +1870,7 @@
           <a:p>
             <a:fld id="{0022677E-7FF4-B24E-882D-1485C2C20337}" type="datetimeFigureOut">
               <a:rPr lang="en-GB" smtClean="0"/>
-              <a:t>25/04/2021</a:t>
+              <a:t>03/05/2021</a:t>
             </a:fld>
             <a:endParaRPr lang="en-GB"/>
           </a:p>
@@ -2031,7 +2135,7 @@
           <a:p>
             <a:fld id="{0022677E-7FF4-B24E-882D-1485C2C20337}" type="datetimeFigureOut">
               <a:rPr lang="en-GB" smtClean="0"/>
-              <a:t>25/04/2021</a:t>
+              <a:t>03/05/2021</a:t>
             </a:fld>
             <a:endParaRPr lang="en-GB"/>
           </a:p>
@@ -2443,7 +2547,7 @@
           <a:p>
             <a:fld id="{0022677E-7FF4-B24E-882D-1485C2C20337}" type="datetimeFigureOut">
               <a:rPr lang="en-GB" smtClean="0"/>
-              <a:t>25/04/2021</a:t>
+              <a:t>03/05/2021</a:t>
             </a:fld>
             <a:endParaRPr lang="en-GB"/>
           </a:p>
@@ -2584,7 +2688,7 @@
           <a:p>
             <a:fld id="{0022677E-7FF4-B24E-882D-1485C2C20337}" type="datetimeFigureOut">
               <a:rPr lang="en-GB" smtClean="0"/>
-              <a:t>25/04/2021</a:t>
+              <a:t>03/05/2021</a:t>
             </a:fld>
             <a:endParaRPr lang="en-GB"/>
           </a:p>
@@ -2697,7 +2801,7 @@
           <a:p>
             <a:fld id="{0022677E-7FF4-B24E-882D-1485C2C20337}" type="datetimeFigureOut">
               <a:rPr lang="en-GB" smtClean="0"/>
-              <a:t>25/04/2021</a:t>
+              <a:t>03/05/2021</a:t>
             </a:fld>
             <a:endParaRPr lang="en-GB"/>
           </a:p>
@@ -3008,7 +3112,7 @@
           <a:p>
             <a:fld id="{0022677E-7FF4-B24E-882D-1485C2C20337}" type="datetimeFigureOut">
               <a:rPr lang="en-GB" smtClean="0"/>
-              <a:t>25/04/2021</a:t>
+              <a:t>03/05/2021</a:t>
             </a:fld>
             <a:endParaRPr lang="en-GB"/>
           </a:p>
@@ -3296,7 +3400,7 @@
           <a:p>
             <a:fld id="{0022677E-7FF4-B24E-882D-1485C2C20337}" type="datetimeFigureOut">
               <a:rPr lang="en-GB" smtClean="0"/>
-              <a:t>25/04/2021</a:t>
+              <a:t>03/05/2021</a:t>
             </a:fld>
             <a:endParaRPr lang="en-GB"/>
           </a:p>
@@ -3537,7 +3641,7 @@
           <a:p>
             <a:fld id="{0022677E-7FF4-B24E-882D-1485C2C20337}" type="datetimeFigureOut">
               <a:rPr lang="en-GB" smtClean="0"/>
-              <a:t>25/04/2021</a:t>
+              <a:t>03/05/2021</a:t>
             </a:fld>
             <a:endParaRPr lang="en-GB"/>
           </a:p>
@@ -4350,6 +4454,287 @@
     <p:extLst>
       <p:ext uri="{BB962C8B-B14F-4D97-AF65-F5344CB8AC3E}">
         <p14:creationId xmlns:p14="http://schemas.microsoft.com/office/powerpoint/2010/main" val="2398045062"/>
+      </p:ext>
+    </p:extLst>
+  </p:cSld>
+  <p:clrMapOvr>
+    <a:masterClrMapping/>
+  </p:clrMapOvr>
+</p:sld>
+</file>
+
+<file path=ppt/slides/slide11.xml><?xml version="1.0" encoding="utf-8"?>
+<p:sld xmlns:a="http://schemas.openxmlformats.org/drawingml/2006/main" xmlns:r="http://schemas.openxmlformats.org/officeDocument/2006/relationships" xmlns:p="http://schemas.openxmlformats.org/presentationml/2006/main">
+  <p:cSld>
+    <p:bg>
+      <p:bgPr>
+        <a:solidFill>
+          <a:schemeClr val="bg1"/>
+        </a:solidFill>
+        <a:effectLst/>
+      </p:bgPr>
+    </p:bg>
+    <p:spTree>
+      <p:nvGrpSpPr>
+        <p:cNvPr id="1" name=""/>
+        <p:cNvGrpSpPr/>
+        <p:nvPr/>
+      </p:nvGrpSpPr>
+      <p:grpSpPr>
+        <a:xfrm>
+          <a:off x="0" y="0"/>
+          <a:ext cx="0" cy="0"/>
+          <a:chOff x="0" y="0"/>
+          <a:chExt cx="0" cy="0"/>
+        </a:xfrm>
+      </p:grpSpPr>
+      <p:sp>
+        <p:nvSpPr>
+          <p:cNvPr id="26" name="Rectangle 13">
+            <a:extLst>
+              <a:ext uri="{FF2B5EF4-FFF2-40B4-BE49-F238E27FC236}">
+                <a16:creationId xmlns:a16="http://schemas.microsoft.com/office/drawing/2014/main" id="{CEB41C5C-0F34-4DDA-9D7C-5E717F35F60C}"/>
+              </a:ext>
+              <a:ext uri="{C183D7F6-B498-43B3-948B-1728B52AA6E4}">
+                <adec:decorative xmlns:adec="http://schemas.microsoft.com/office/drawing/2017/decorative" val="1"/>
+              </a:ext>
+            </a:extLst>
+          </p:cNvPr>
+          <p:cNvSpPr>
+            <a:spLocks noGrp="1" noRot="1" noChangeAspect="1" noMove="1" noResize="1" noEditPoints="1" noAdjustHandles="1" noChangeArrowheads="1" noChangeShapeType="1" noTextEdit="1"/>
+          </p:cNvSpPr>
+          <p:nvPr>
+            <p:extLst>
+              <p:ext uri="{386F3935-93C4-4BCD-93E2-E3B085C9AB24}">
+                <p16:designElem xmlns:p16="http://schemas.microsoft.com/office/powerpoint/2015/main" val="1"/>
+              </p:ext>
+            </p:extLst>
+          </p:nvPr>
+        </p:nvSpPr>
+        <p:spPr bwMode="ltGray">
+          <a:xfrm>
+            <a:off x="336384" y="303591"/>
+            <a:ext cx="4334256" cy="5896743"/>
+          </a:xfrm>
+          <a:prstGeom prst="rect">
+            <a:avLst/>
+          </a:prstGeom>
+          <a:solidFill>
+            <a:schemeClr val="tx1">
+              <a:lumMod val="75000"/>
+              <a:lumOff val="25000"/>
+            </a:schemeClr>
+          </a:solidFill>
+          <a:ln w="127000" cap="sq" cmpd="thinThick">
+            <a:solidFill>
+              <a:schemeClr val="tx1">
+                <a:lumMod val="75000"/>
+                <a:lumOff val="25000"/>
+              </a:schemeClr>
+            </a:solidFill>
+          </a:ln>
+        </p:spPr>
+        <p:style>
+          <a:lnRef idx="2">
+            <a:schemeClr val="accent1">
+              <a:shade val="50000"/>
+            </a:schemeClr>
+          </a:lnRef>
+          <a:fillRef idx="1">
+            <a:schemeClr val="accent1"/>
+          </a:fillRef>
+          <a:effectRef idx="0">
+            <a:schemeClr val="accent1"/>
+          </a:effectRef>
+          <a:fontRef idx="minor">
+            <a:schemeClr val="lt1"/>
+          </a:fontRef>
+        </p:style>
+        <p:txBody>
+          <a:bodyPr rtlCol="0" anchor="ctr"/>
+          <a:lstStyle/>
+          <a:p>
+            <a:pPr algn="ctr"/>
+            <a:endParaRPr lang="en-US"/>
+          </a:p>
+        </p:txBody>
+      </p:sp>
+      <p:sp>
+        <p:nvSpPr>
+          <p:cNvPr id="2" name="Title 1">
+            <a:extLst>
+              <a:ext uri="{FF2B5EF4-FFF2-40B4-BE49-F238E27FC236}">
+                <a16:creationId xmlns:a16="http://schemas.microsoft.com/office/drawing/2014/main" id="{0C8893BE-BB41-0142-A941-7BCB5D2A6EE7}"/>
+              </a:ext>
+            </a:extLst>
+          </p:cNvPr>
+          <p:cNvSpPr>
+            <a:spLocks noGrp="1"/>
+          </p:cNvSpPr>
+          <p:nvPr>
+            <p:ph type="title"/>
+          </p:nvPr>
+        </p:nvSpPr>
+        <p:spPr>
+          <a:xfrm>
+            <a:off x="594360" y="640263"/>
+            <a:ext cx="3822192" cy="1344975"/>
+          </a:xfrm>
+        </p:spPr>
+        <p:txBody>
+          <a:bodyPr vert="horz" lIns="91440" tIns="45720" rIns="91440" bIns="45720" rtlCol="0" anchor="ctr">
+            <a:normAutofit/>
+          </a:bodyPr>
+          <a:lstStyle/>
+          <a:p>
+            <a:r>
+              <a:rPr lang="en-US" sz="3600" kern="1200">
+                <a:solidFill>
+                  <a:schemeClr val="bg1"/>
+                </a:solidFill>
+                <a:latin typeface="+mj-lt"/>
+                <a:ea typeface="+mj-ea"/>
+                <a:cs typeface="+mj-cs"/>
+              </a:rPr>
+              <a:t>Yes / no checker testing</a:t>
+            </a:r>
+          </a:p>
+        </p:txBody>
+      </p:sp>
+      <p:cxnSp>
+        <p:nvCxnSpPr>
+          <p:cNvPr id="27" name="Straight Connector 15">
+            <a:extLst>
+              <a:ext uri="{FF2B5EF4-FFF2-40B4-BE49-F238E27FC236}">
+                <a16:creationId xmlns:a16="http://schemas.microsoft.com/office/drawing/2014/main" id="{57E1E5E6-F385-4E9C-B201-BA5BDE5CAD52}"/>
+              </a:ext>
+              <a:ext uri="{C183D7F6-B498-43B3-948B-1728B52AA6E4}">
+                <adec:decorative xmlns:adec="http://schemas.microsoft.com/office/drawing/2017/decorative" val="1"/>
+              </a:ext>
+            </a:extLst>
+          </p:cNvPr>
+          <p:cNvCxnSpPr>
+            <a:cxnSpLocks noGrp="1" noRot="1" noChangeAspect="1" noMove="1" noResize="1" noEditPoints="1" noAdjustHandles="1" noChangeArrowheads="1" noChangeShapeType="1"/>
+          </p:cNvCxnSpPr>
+          <p:nvPr>
+            <p:extLst>
+              <p:ext uri="{386F3935-93C4-4BCD-93E2-E3B085C9AB24}">
+                <p16:designElem xmlns:p16="http://schemas.microsoft.com/office/powerpoint/2015/main" val="1"/>
+              </p:ext>
+            </p:extLst>
+          </p:nvPr>
+        </p:nvCxnSpPr>
+        <p:spPr>
+          <a:xfrm>
+            <a:off x="704088" y="2050687"/>
+            <a:ext cx="3685032" cy="0"/>
+          </a:xfrm>
+          <a:prstGeom prst="line">
+            <a:avLst/>
+          </a:prstGeom>
+          <a:ln w="22225">
+            <a:solidFill>
+              <a:srgbClr val="E7E6E6"/>
+            </a:solidFill>
+          </a:ln>
+        </p:spPr>
+        <p:style>
+          <a:lnRef idx="1">
+            <a:schemeClr val="accent1"/>
+          </a:lnRef>
+          <a:fillRef idx="0">
+            <a:schemeClr val="accent1"/>
+          </a:fillRef>
+          <a:effectRef idx="0">
+            <a:schemeClr val="accent1"/>
+          </a:effectRef>
+          <a:fontRef idx="minor">
+            <a:schemeClr val="tx1"/>
+          </a:fontRef>
+        </p:style>
+      </p:cxnSp>
+      <p:sp>
+        <p:nvSpPr>
+          <p:cNvPr id="5" name="TextBox 4">
+            <a:extLst>
+              <a:ext uri="{FF2B5EF4-FFF2-40B4-BE49-F238E27FC236}">
+                <a16:creationId xmlns:a16="http://schemas.microsoft.com/office/drawing/2014/main" id="{18526060-96E6-C049-B46C-408A3739C664}"/>
+              </a:ext>
+            </a:extLst>
+          </p:cNvPr>
+          <p:cNvSpPr txBox="1"/>
+          <p:nvPr/>
+        </p:nvSpPr>
+        <p:spPr>
+          <a:xfrm>
+            <a:off x="593610" y="2121763"/>
+            <a:ext cx="3822192" cy="3773010"/>
+          </a:xfrm>
+          <a:prstGeom prst="rect">
+            <a:avLst/>
+          </a:prstGeom>
+        </p:spPr>
+        <p:txBody>
+          <a:bodyPr vert="horz" lIns="91440" tIns="45720" rIns="91440" bIns="45720" rtlCol="0">
+            <a:normAutofit/>
+          </a:bodyPr>
+          <a:lstStyle/>
+          <a:p>
+            <a:pPr indent="-228600">
+              <a:lnSpc>
+                <a:spcPct val="90000"/>
+              </a:lnSpc>
+              <a:spcAft>
+                <a:spcPts val="600"/>
+              </a:spcAft>
+              <a:buFont typeface="Arial" panose="020B0604020202020204" pitchFamily="34" charset="0"/>
+              <a:buChar char="•"/>
+            </a:pPr>
+            <a:r>
+              <a:rPr lang="en-US" sz="2000">
+                <a:solidFill>
+                  <a:schemeClr val="bg1"/>
+                </a:solidFill>
+              </a:rPr>
+              <a:t>All cases worked as expected (code has been looped to make testing easier)</a:t>
+            </a:r>
+          </a:p>
+        </p:txBody>
+      </p:sp>
+      <p:pic>
+        <p:nvPicPr>
+          <p:cNvPr id="4" name="Picture 3" descr="Text&#10;&#10;Description automatically generated">
+            <a:extLst>
+              <a:ext uri="{FF2B5EF4-FFF2-40B4-BE49-F238E27FC236}">
+                <a16:creationId xmlns:a16="http://schemas.microsoft.com/office/drawing/2014/main" id="{90434224-9C81-9E43-9ADE-E77CDCF93602}"/>
+              </a:ext>
+            </a:extLst>
+          </p:cNvPr>
+          <p:cNvPicPr>
+            <a:picLocks noChangeAspect="1"/>
+          </p:cNvPicPr>
+          <p:nvPr/>
+        </p:nvPicPr>
+        <p:blipFill>
+          <a:blip r:embed="rId2"/>
+          <a:stretch>
+            <a:fillRect/>
+          </a:stretch>
+        </p:blipFill>
+        <p:spPr>
+          <a:xfrm>
+            <a:off x="5399442" y="484632"/>
+            <a:ext cx="6019200" cy="5733287"/>
+          </a:xfrm>
+          <a:prstGeom prst="rect">
+            <a:avLst/>
+          </a:prstGeom>
+        </p:spPr>
+      </p:pic>
+    </p:spTree>
+    <p:extLst>
+      <p:ext uri="{BB962C8B-B14F-4D97-AF65-F5344CB8AC3E}">
+        <p14:creationId xmlns:p14="http://schemas.microsoft.com/office/powerpoint/2010/main" val="483687354"/>
       </p:ext>
     </p:extLst>
   </p:cSld>

</xml_diff>